<commit_message>
added text to user manual over movies
</commit_message>
<xml_diff>
--- a/do not ZIP for moodle/user_manual.pptx
+++ b/do not ZIP for moodle/user_manual.pptx
@@ -6821,6 +6821,144 @@
       </p:sp>
       <p:sp>
         <p:nvSpPr>
+          <p:cNvPr id="16" name="מלבן: פינות מעוגלות 15">
+            <a:extLst>
+              <a:ext uri="{FF2B5EF4-FFF2-40B4-BE49-F238E27FC236}">
+                <a16:creationId xmlns:a16="http://schemas.microsoft.com/office/drawing/2014/main" id="{54F734C8-A8AD-33EE-CD5C-5DC6EC02C333}"/>
+              </a:ext>
+            </a:extLst>
+          </p:cNvPr>
+          <p:cNvSpPr/>
+          <p:nvPr/>
+        </p:nvSpPr>
+        <p:spPr>
+          <a:xfrm>
+            <a:off x="6962227" y="1441636"/>
+            <a:ext cx="1681200" cy="2520000"/>
+          </a:xfrm>
+          <a:prstGeom prst="roundRect">
+            <a:avLst/>
+          </a:prstGeom>
+          <a:solidFill>
+            <a:srgbClr val="092630">
+              <a:alpha val="60000"/>
+            </a:srgbClr>
+          </a:solidFill>
+          <a:ln>
+            <a:solidFill>
+              <a:srgbClr val="EE4854"/>
+            </a:solidFill>
+          </a:ln>
+        </p:spPr>
+        <p:style>
+          <a:lnRef idx="2">
+            <a:schemeClr val="accent1">
+              <a:shade val="15000"/>
+            </a:schemeClr>
+          </a:lnRef>
+          <a:fillRef idx="1">
+            <a:schemeClr val="accent1"/>
+          </a:fillRef>
+          <a:effectRef idx="0">
+            <a:schemeClr val="accent1"/>
+          </a:effectRef>
+          <a:fontRef idx="minor">
+            <a:schemeClr val="lt1"/>
+          </a:fontRef>
+        </p:style>
+        <p:txBody>
+          <a:bodyPr rtlCol="1" anchor="ctr"/>
+          <a:lstStyle/>
+          <a:p>
+            <a:pPr algn="ctr">
+              <a:lnSpc>
+                <a:spcPct val="150000"/>
+              </a:lnSpc>
+            </a:pPr>
+            <a:r>
+              <a:rPr lang="en-US" sz="1000" dirty="0">
+                <a:solidFill>
+                  <a:schemeClr val="bg1"/>
+                </a:solidFill>
+                <a:latin typeface="Bahnschrift SemiBold" panose="020B0502040204020203" pitchFamily="34" charset="0"/>
+              </a:rPr>
+              <a:t>Title: Paul</a:t>
+            </a:r>
+          </a:p>
+          <a:p>
+            <a:pPr algn="ctr">
+              <a:lnSpc>
+                <a:spcPct val="150000"/>
+              </a:lnSpc>
+            </a:pPr>
+            <a:r>
+              <a:rPr lang="en-US" sz="1000" dirty="0">
+                <a:solidFill>
+                  <a:schemeClr val="bg1"/>
+                </a:solidFill>
+                <a:latin typeface="Bahnschrift SemiBold" panose="020B0502040204020203" pitchFamily="34" charset="0"/>
+              </a:rPr>
+              <a:t>Genres: Adventure, Comedy, Science Fiction</a:t>
+            </a:r>
+          </a:p>
+          <a:p>
+            <a:pPr algn="ctr">
+              <a:lnSpc>
+                <a:spcPct val="150000"/>
+              </a:lnSpc>
+            </a:pPr>
+            <a:r>
+              <a:rPr lang="en-US" sz="1000" dirty="0">
+                <a:solidFill>
+                  <a:schemeClr val="bg1"/>
+                </a:solidFill>
+                <a:latin typeface="Bahnschrift SemiBold" panose="020B0502040204020203" pitchFamily="34" charset="0"/>
+              </a:rPr>
+              <a:t>Release Year: 2011 </a:t>
+            </a:r>
+          </a:p>
+          <a:p>
+            <a:pPr algn="ctr">
+              <a:lnSpc>
+                <a:spcPct val="150000"/>
+              </a:lnSpc>
+            </a:pPr>
+            <a:r>
+              <a:rPr lang="en-US" sz="1000" dirty="0">
+                <a:solidFill>
+                  <a:schemeClr val="bg1"/>
+                </a:solidFill>
+                <a:latin typeface="Bahnschrift SemiBold" panose="020B0502040204020203" pitchFamily="34" charset="0"/>
+              </a:rPr>
+              <a:t>Overview: For the past 60 years, a space-traveling smart...</a:t>
+            </a:r>
+          </a:p>
+          <a:p>
+            <a:pPr algn="ctr">
+              <a:lnSpc>
+                <a:spcPct val="150000"/>
+              </a:lnSpc>
+            </a:pPr>
+            <a:r>
+              <a:rPr lang="en-US" sz="1000" dirty="0">
+                <a:solidFill>
+                  <a:schemeClr val="bg1"/>
+                </a:solidFill>
+                <a:latin typeface="Bahnschrift SemiBold" panose="020B0502040204020203" pitchFamily="34" charset="0"/>
+              </a:rPr>
+              <a:t>Rating: 6.727</a:t>
+            </a:r>
+            <a:endParaRPr lang="he-IL" sz="1000" dirty="0">
+              <a:solidFill>
+                <a:schemeClr val="bg1"/>
+              </a:solidFill>
+              <a:latin typeface="Bahnschrift SemiBold" panose="020B0502040204020203" pitchFamily="34" charset="0"/>
+            </a:endParaRPr>
+          </a:p>
+        </p:txBody>
+      </p:sp>
+      <p:sp>
+        <p:nvSpPr>
           <p:cNvPr id="6" name="בועת מחשבה: ענן 5">
             <a:extLst>
               <a:ext uri="{FF2B5EF4-FFF2-40B4-BE49-F238E27FC236}">
@@ -6890,6 +7028,42 @@
           </a:p>
         </p:txBody>
       </p:sp>
+      <p:pic>
+        <p:nvPicPr>
+          <p:cNvPr id="19" name="תמונה 18">
+            <a:extLst>
+              <a:ext uri="{FF2B5EF4-FFF2-40B4-BE49-F238E27FC236}">
+                <a16:creationId xmlns:a16="http://schemas.microsoft.com/office/drawing/2014/main" id="{CA1D9483-7B30-FDE6-D929-E84C0BF01022}"/>
+              </a:ext>
+            </a:extLst>
+          </p:cNvPr>
+          <p:cNvPicPr>
+            <a:picLocks noChangeAspect="1"/>
+          </p:cNvPicPr>
+          <p:nvPr/>
+        </p:nvPicPr>
+        <p:blipFill>
+          <a:blip r:embed="rId9">
+            <a:extLst>
+              <a:ext uri="{28A0092B-C50C-407E-A947-70E740481C1C}">
+                <a14:useLocalDpi xmlns:a14="http://schemas.microsoft.com/office/drawing/2010/main" val="0"/>
+              </a:ext>
+            </a:extLst>
+          </a:blip>
+          <a:stretch>
+            <a:fillRect/>
+          </a:stretch>
+        </p:blipFill>
+        <p:spPr>
+          <a:xfrm>
+            <a:off x="8372002" y="3331029"/>
+            <a:ext cx="227400" cy="360000"/>
+          </a:xfrm>
+          <a:prstGeom prst="rect">
+            <a:avLst/>
+          </a:prstGeom>
+        </p:spPr>
+      </p:pic>
     </p:spTree>
     <p:extLst>
       <p:ext uri="{BB962C8B-B14F-4D97-AF65-F5344CB8AC3E}">
@@ -7680,6 +7854,199 @@
           </a:p>
         </p:txBody>
       </p:sp>
+      <p:sp>
+        <p:nvSpPr>
+          <p:cNvPr id="8" name="מלבן: פינות מעוגלות 7">
+            <a:extLst>
+              <a:ext uri="{FF2B5EF4-FFF2-40B4-BE49-F238E27FC236}">
+                <a16:creationId xmlns:a16="http://schemas.microsoft.com/office/drawing/2014/main" id="{A938587C-CB63-3B2A-F12F-445FE893669E}"/>
+              </a:ext>
+            </a:extLst>
+          </p:cNvPr>
+          <p:cNvSpPr/>
+          <p:nvPr/>
+        </p:nvSpPr>
+        <p:spPr>
+          <a:xfrm>
+            <a:off x="2638983" y="1441636"/>
+            <a:ext cx="1681200" cy="2520000"/>
+          </a:xfrm>
+          <a:prstGeom prst="roundRect">
+            <a:avLst/>
+          </a:prstGeom>
+          <a:solidFill>
+            <a:srgbClr val="092630">
+              <a:alpha val="60000"/>
+            </a:srgbClr>
+          </a:solidFill>
+          <a:ln>
+            <a:solidFill>
+              <a:srgbClr val="EE4854"/>
+            </a:solidFill>
+          </a:ln>
+        </p:spPr>
+        <p:style>
+          <a:lnRef idx="2">
+            <a:schemeClr val="accent1">
+              <a:shade val="15000"/>
+            </a:schemeClr>
+          </a:lnRef>
+          <a:fillRef idx="1">
+            <a:schemeClr val="accent1"/>
+          </a:fillRef>
+          <a:effectRef idx="0">
+            <a:schemeClr val="accent1"/>
+          </a:effectRef>
+          <a:fontRef idx="minor">
+            <a:schemeClr val="lt1"/>
+          </a:fontRef>
+        </p:style>
+        <p:txBody>
+          <a:bodyPr rtlCol="1" anchor="ctr"/>
+          <a:lstStyle/>
+          <a:p>
+            <a:pPr algn="ctr">
+              <a:lnSpc>
+                <a:spcPct val="150000"/>
+              </a:lnSpc>
+            </a:pPr>
+            <a:r>
+              <a:rPr lang="en-US" sz="1000" dirty="0">
+                <a:solidFill>
+                  <a:schemeClr val="bg1"/>
+                </a:solidFill>
+                <a:latin typeface="Bahnschrift SemiBold" panose="020B0502040204020203" pitchFamily="34" charset="0"/>
+              </a:rPr>
+              <a:t>Title: Hotel Transylvania 2</a:t>
+            </a:r>
+          </a:p>
+          <a:p>
+            <a:pPr algn="ctr">
+              <a:lnSpc>
+                <a:spcPct val="150000"/>
+              </a:lnSpc>
+            </a:pPr>
+            <a:r>
+              <a:rPr lang="en-US" sz="1000" dirty="0">
+                <a:solidFill>
+                  <a:schemeClr val="bg1"/>
+                </a:solidFill>
+                <a:latin typeface="Bahnschrift SemiBold" panose="020B0502040204020203" pitchFamily="34" charset="0"/>
+              </a:rPr>
+              <a:t>Release Year: 2015</a:t>
+            </a:r>
+          </a:p>
+          <a:p>
+            <a:pPr algn="ctr">
+              <a:lnSpc>
+                <a:spcPct val="150000"/>
+              </a:lnSpc>
+            </a:pPr>
+            <a:r>
+              <a:rPr lang="en-US" sz="1000" dirty="0">
+                <a:solidFill>
+                  <a:schemeClr val="bg1"/>
+                </a:solidFill>
+                <a:latin typeface="Bahnschrift SemiBold" panose="020B0502040204020203" pitchFamily="34" charset="0"/>
+              </a:rPr>
+              <a:t>Director</a:t>
+            </a:r>
+            <a:r>
+              <a:rPr lang="en-US" sz="1000">
+                <a:solidFill>
+                  <a:schemeClr val="bg1"/>
+                </a:solidFill>
+                <a:latin typeface="Bahnschrift SemiBold" panose="020B0502040204020203" pitchFamily="34" charset="0"/>
+              </a:rPr>
+              <a:t>: Genndy</a:t>
+            </a:r>
+            <a:r>
+              <a:rPr lang="en-US" sz="1000" dirty="0">
+                <a:solidFill>
+                  <a:schemeClr val="bg1"/>
+                </a:solidFill>
+                <a:latin typeface="Bahnschrift SemiBold" panose="020B0502040204020203" pitchFamily="34" charset="0"/>
+              </a:rPr>
+              <a:t> Tartakovsky</a:t>
+            </a:r>
+          </a:p>
+          <a:p>
+            <a:pPr algn="ctr">
+              <a:lnSpc>
+                <a:spcPct val="150000"/>
+              </a:lnSpc>
+            </a:pPr>
+            <a:r>
+              <a:rPr lang="en-US" sz="1000" dirty="0">
+                <a:solidFill>
+                  <a:schemeClr val="bg1"/>
+                </a:solidFill>
+                <a:latin typeface="Bahnschrift SemiBold" panose="020B0502040204020203" pitchFamily="34" charset="0"/>
+              </a:rPr>
+              <a:t>Overview: When the old-old-old-fashioned vampire Vlad ar... </a:t>
+            </a:r>
+            <a:br>
+              <a:rPr lang="en-US" sz="1000" dirty="0">
+                <a:solidFill>
+                  <a:schemeClr val="bg1"/>
+                </a:solidFill>
+                <a:latin typeface="Bahnschrift SemiBold" panose="020B0502040204020203" pitchFamily="34" charset="0"/>
+              </a:rPr>
+            </a:br>
+            <a:r>
+              <a:rPr lang="en-US" sz="1000" dirty="0">
+                <a:solidFill>
+                  <a:schemeClr val="bg1"/>
+                </a:solidFill>
+                <a:latin typeface="Bahnschrift SemiBold" panose="020B0502040204020203" pitchFamily="34" charset="0"/>
+              </a:rPr>
+              <a:t>Rating: 6.800</a:t>
+            </a:r>
+            <a:endParaRPr lang="he-IL" sz="1000" dirty="0">
+              <a:solidFill>
+                <a:schemeClr val="bg1"/>
+              </a:solidFill>
+              <a:latin typeface="Bahnschrift SemiBold" panose="020B0502040204020203" pitchFamily="34" charset="0"/>
+            </a:endParaRPr>
+          </a:p>
+        </p:txBody>
+      </p:sp>
+      <p:pic>
+        <p:nvPicPr>
+          <p:cNvPr id="10" name="תמונה 9">
+            <a:extLst>
+              <a:ext uri="{FF2B5EF4-FFF2-40B4-BE49-F238E27FC236}">
+                <a16:creationId xmlns:a16="http://schemas.microsoft.com/office/drawing/2014/main" id="{DEAEA9A2-5654-693B-F966-D61A351555BB}"/>
+              </a:ext>
+            </a:extLst>
+          </p:cNvPr>
+          <p:cNvPicPr>
+            <a:picLocks noChangeAspect="1"/>
+          </p:cNvPicPr>
+          <p:nvPr/>
+        </p:nvPicPr>
+        <p:blipFill>
+          <a:blip r:embed="rId9">
+            <a:extLst>
+              <a:ext uri="{28A0092B-C50C-407E-A947-70E740481C1C}">
+                <a14:useLocalDpi xmlns:a14="http://schemas.microsoft.com/office/drawing/2010/main" val="0"/>
+              </a:ext>
+            </a:extLst>
+          </a:blip>
+          <a:stretch>
+            <a:fillRect/>
+          </a:stretch>
+        </p:blipFill>
+        <p:spPr>
+          <a:xfrm>
+            <a:off x="4024974" y="2299119"/>
+            <a:ext cx="227400" cy="360000"/>
+          </a:xfrm>
+          <a:prstGeom prst="rect">
+            <a:avLst/>
+          </a:prstGeom>
+        </p:spPr>
+      </p:pic>
     </p:spTree>
     <p:extLst>
       <p:ext uri="{BB962C8B-B14F-4D97-AF65-F5344CB8AC3E}">
@@ -8354,6 +8721,141 @@
           </a:p>
         </p:txBody>
       </p:sp>
+      <p:sp>
+        <p:nvSpPr>
+          <p:cNvPr id="6" name="מלבן: פינות מעוגלות 5">
+            <a:extLst>
+              <a:ext uri="{FF2B5EF4-FFF2-40B4-BE49-F238E27FC236}">
+                <a16:creationId xmlns:a16="http://schemas.microsoft.com/office/drawing/2014/main" id="{4E565DE7-663F-4155-8FEE-902DE3914AC1}"/>
+              </a:ext>
+            </a:extLst>
+          </p:cNvPr>
+          <p:cNvSpPr/>
+          <p:nvPr/>
+        </p:nvSpPr>
+        <p:spPr>
+          <a:xfrm>
+            <a:off x="1590890" y="1435308"/>
+            <a:ext cx="1681200" cy="2520000"/>
+          </a:xfrm>
+          <a:prstGeom prst="roundRect">
+            <a:avLst/>
+          </a:prstGeom>
+          <a:solidFill>
+            <a:srgbClr val="092630">
+              <a:alpha val="60000"/>
+            </a:srgbClr>
+          </a:solidFill>
+          <a:ln>
+            <a:solidFill>
+              <a:srgbClr val="EE4854"/>
+            </a:solidFill>
+          </a:ln>
+        </p:spPr>
+        <p:style>
+          <a:lnRef idx="2">
+            <a:schemeClr val="accent1">
+              <a:shade val="15000"/>
+            </a:schemeClr>
+          </a:lnRef>
+          <a:fillRef idx="1">
+            <a:schemeClr val="accent1"/>
+          </a:fillRef>
+          <a:effectRef idx="0">
+            <a:schemeClr val="accent1"/>
+          </a:effectRef>
+          <a:fontRef idx="minor">
+            <a:schemeClr val="lt1"/>
+          </a:fontRef>
+        </p:style>
+        <p:txBody>
+          <a:bodyPr rtlCol="1" anchor="ctr"/>
+          <a:lstStyle/>
+          <a:p>
+            <a:pPr algn="ctr">
+              <a:lnSpc>
+                <a:spcPct val="150000"/>
+              </a:lnSpc>
+            </a:pPr>
+            <a:r>
+              <a:rPr lang="en-US" sz="1000" dirty="0">
+                <a:solidFill>
+                  <a:schemeClr val="bg1"/>
+                </a:solidFill>
+                <a:latin typeface="Bahnschrift SemiBold" panose="020B0502040204020203" pitchFamily="34" charset="0"/>
+              </a:rPr>
+              <a:t>Mia Farrow</a:t>
+            </a:r>
+          </a:p>
+          <a:p>
+            <a:pPr algn="ctr">
+              <a:lnSpc>
+                <a:spcPct val="150000"/>
+              </a:lnSpc>
+            </a:pPr>
+            <a:r>
+              <a:rPr lang="en-US" sz="1000">
+                <a:solidFill>
+                  <a:schemeClr val="bg1"/>
+                </a:solidFill>
+                <a:latin typeface="Bahnschrift SemiBold" panose="020B0502040204020203" pitchFamily="34" charset="0"/>
+              </a:rPr>
+              <a:t>Movie Count</a:t>
+            </a:r>
+            <a:r>
+              <a:rPr lang="en-US" sz="1000" dirty="0">
+                <a:solidFill>
+                  <a:schemeClr val="bg1"/>
+                </a:solidFill>
+                <a:latin typeface="Bahnschrift SemiBold" panose="020B0502040204020203" pitchFamily="34" charset="0"/>
+              </a:rPr>
+              <a:t>: 4</a:t>
+            </a:r>
+            <a:endParaRPr lang="he-IL" sz="1000" dirty="0">
+              <a:solidFill>
+                <a:schemeClr val="bg1"/>
+              </a:solidFill>
+              <a:latin typeface="Bahnschrift SemiBold" panose="020B0502040204020203" pitchFamily="34" charset="0"/>
+            </a:endParaRPr>
+          </a:p>
+        </p:txBody>
+      </p:sp>
+      <p:pic>
+        <p:nvPicPr>
+          <p:cNvPr id="10" name="תמונה 9">
+            <a:extLst>
+              <a:ext uri="{FF2B5EF4-FFF2-40B4-BE49-F238E27FC236}">
+                <a16:creationId xmlns:a16="http://schemas.microsoft.com/office/drawing/2014/main" id="{BD13E762-6613-37E1-756B-74DC3BB4B8B7}"/>
+              </a:ext>
+            </a:extLst>
+          </p:cNvPr>
+          <p:cNvPicPr>
+            <a:picLocks noChangeAspect="1"/>
+          </p:cNvPicPr>
+          <p:nvPr/>
+        </p:nvPicPr>
+        <p:blipFill>
+          <a:blip r:embed="rId8">
+            <a:extLst>
+              <a:ext uri="{28A0092B-C50C-407E-A947-70E740481C1C}">
+                <a14:useLocalDpi xmlns:a14="http://schemas.microsoft.com/office/drawing/2010/main" val="0"/>
+              </a:ext>
+            </a:extLst>
+          </a:blip>
+          <a:stretch>
+            <a:fillRect/>
+          </a:stretch>
+        </p:blipFill>
+        <p:spPr>
+          <a:xfrm>
+            <a:off x="2900117" y="3229428"/>
+            <a:ext cx="227400" cy="360000"/>
+          </a:xfrm>
+          <a:prstGeom prst="rect">
+            <a:avLst/>
+          </a:prstGeom>
+        </p:spPr>
+      </p:pic>
     </p:spTree>
     <p:extLst>
       <p:ext uri="{BB962C8B-B14F-4D97-AF65-F5344CB8AC3E}">
@@ -9028,6 +9530,142 @@
           </a:p>
         </p:txBody>
       </p:sp>
+      <p:sp>
+        <p:nvSpPr>
+          <p:cNvPr id="4" name="מלבן: פינות מעוגלות 3">
+            <a:extLst>
+              <a:ext uri="{FF2B5EF4-FFF2-40B4-BE49-F238E27FC236}">
+                <a16:creationId xmlns:a16="http://schemas.microsoft.com/office/drawing/2014/main" id="{4F17E15C-7C63-0ACC-16C7-57C1DED17FF3}"/>
+              </a:ext>
+            </a:extLst>
+          </p:cNvPr>
+          <p:cNvSpPr/>
+          <p:nvPr/>
+        </p:nvSpPr>
+        <p:spPr>
+          <a:xfrm>
+            <a:off x="3730500" y="1441636"/>
+            <a:ext cx="1681200" cy="2520000"/>
+          </a:xfrm>
+          <a:prstGeom prst="roundRect">
+            <a:avLst/>
+          </a:prstGeom>
+          <a:solidFill>
+            <a:srgbClr val="092630">
+              <a:alpha val="60000"/>
+            </a:srgbClr>
+          </a:solidFill>
+          <a:ln>
+            <a:solidFill>
+              <a:srgbClr val="EE4854"/>
+            </a:solidFill>
+          </a:ln>
+        </p:spPr>
+        <p:style>
+          <a:lnRef idx="2">
+            <a:schemeClr val="accent1">
+              <a:shade val="15000"/>
+            </a:schemeClr>
+          </a:lnRef>
+          <a:fillRef idx="1">
+            <a:schemeClr val="accent1"/>
+          </a:fillRef>
+          <a:effectRef idx="0">
+            <a:schemeClr val="accent1"/>
+          </a:effectRef>
+          <a:fontRef idx="minor">
+            <a:schemeClr val="lt1"/>
+          </a:fontRef>
+        </p:style>
+        <p:txBody>
+          <a:bodyPr rtlCol="1" anchor="ctr"/>
+          <a:lstStyle/>
+          <a:p>
+            <a:pPr algn="ctr">
+              <a:lnSpc>
+                <a:spcPct val="150000"/>
+              </a:lnSpc>
+            </a:pPr>
+            <a:r>
+              <a:rPr lang="en-US" sz="1000" dirty="0">
+                <a:solidFill>
+                  <a:schemeClr val="bg1"/>
+                </a:solidFill>
+                <a:latin typeface="Bahnschrift SemiBold" panose="020B0502040204020203" pitchFamily="34" charset="0"/>
+              </a:rPr>
+              <a:t>Michelle Pfeiffer</a:t>
+            </a:r>
+          </a:p>
+          <a:p>
+            <a:pPr algn="ctr">
+              <a:lnSpc>
+                <a:spcPct val="150000"/>
+              </a:lnSpc>
+            </a:pPr>
+            <a:r>
+              <a:rPr lang="en-US" sz="1000" dirty="0">
+                <a:solidFill>
+                  <a:schemeClr val="bg1"/>
+                </a:solidFill>
+                <a:latin typeface="Bahnschrift SemiBold" panose="020B0502040204020203" pitchFamily="34" charset="0"/>
+              </a:rPr>
+              <a:t>Birthday: 1958-04-29</a:t>
+            </a:r>
+          </a:p>
+          <a:p>
+            <a:pPr algn="ctr">
+              <a:lnSpc>
+                <a:spcPct val="150000"/>
+              </a:lnSpc>
+            </a:pPr>
+            <a:r>
+              <a:rPr lang="en-US" sz="1000" dirty="0">
+                <a:solidFill>
+                  <a:schemeClr val="bg1"/>
+                </a:solidFill>
+                <a:latin typeface="Bahnschrift SemiBold" panose="020B0502040204020203" pitchFamily="34" charset="0"/>
+              </a:rPr>
+              <a:t>Movie Count: 2</a:t>
+            </a:r>
+          </a:p>
+        </p:txBody>
+      </p:sp>
+      <p:pic>
+        <p:nvPicPr>
+          <p:cNvPr id="6" name="תמונה 5">
+            <a:extLst>
+              <a:ext uri="{FF2B5EF4-FFF2-40B4-BE49-F238E27FC236}">
+                <a16:creationId xmlns:a16="http://schemas.microsoft.com/office/drawing/2014/main" id="{7EB7A97D-E570-DA6B-2E2A-FDCE144CABF5}"/>
+              </a:ext>
+            </a:extLst>
+          </p:cNvPr>
+          <p:cNvPicPr>
+            <a:picLocks noChangeAspect="1"/>
+          </p:cNvPicPr>
+          <p:nvPr/>
+        </p:nvPicPr>
+        <p:blipFill>
+          <a:blip r:embed="rId8">
+            <a:extLst>
+              <a:ext uri="{28A0092B-C50C-407E-A947-70E740481C1C}">
+                <a14:useLocalDpi xmlns:a14="http://schemas.microsoft.com/office/drawing/2010/main" val="0"/>
+              </a:ext>
+            </a:extLst>
+          </a:blip>
+          <a:stretch>
+            <a:fillRect/>
+          </a:stretch>
+        </p:blipFill>
+        <p:spPr>
+          <a:xfrm>
+            <a:off x="5106288" y="1864110"/>
+            <a:ext cx="227400" cy="360000"/>
+          </a:xfrm>
+          <a:prstGeom prst="rect">
+            <a:avLst/>
+          </a:prstGeom>
+        </p:spPr>
+      </p:pic>
     </p:spTree>
     <p:extLst>
       <p:ext uri="{BB962C8B-B14F-4D97-AF65-F5344CB8AC3E}">
@@ -9815,6 +10453,164 @@
           </a:p>
         </p:txBody>
       </p:sp>
+      <p:sp>
+        <p:nvSpPr>
+          <p:cNvPr id="8" name="מלבן: פינות מעוגלות 7">
+            <a:extLst>
+              <a:ext uri="{FF2B5EF4-FFF2-40B4-BE49-F238E27FC236}">
+                <a16:creationId xmlns:a16="http://schemas.microsoft.com/office/drawing/2014/main" id="{0DADDE9F-E2B8-D081-215F-C84166C18C05}"/>
+              </a:ext>
+            </a:extLst>
+          </p:cNvPr>
+          <p:cNvSpPr/>
+          <p:nvPr/>
+        </p:nvSpPr>
+        <p:spPr>
+          <a:xfrm>
+            <a:off x="2638983" y="1441636"/>
+            <a:ext cx="1681200" cy="2520000"/>
+          </a:xfrm>
+          <a:prstGeom prst="roundRect">
+            <a:avLst/>
+          </a:prstGeom>
+          <a:solidFill>
+            <a:srgbClr val="092630">
+              <a:alpha val="60000"/>
+            </a:srgbClr>
+          </a:solidFill>
+          <a:ln>
+            <a:solidFill>
+              <a:srgbClr val="EE4854"/>
+            </a:solidFill>
+          </a:ln>
+        </p:spPr>
+        <p:style>
+          <a:lnRef idx="2">
+            <a:schemeClr val="accent1">
+              <a:shade val="15000"/>
+            </a:schemeClr>
+          </a:lnRef>
+          <a:fillRef idx="1">
+            <a:schemeClr val="accent1"/>
+          </a:fillRef>
+          <a:effectRef idx="0">
+            <a:schemeClr val="accent1"/>
+          </a:effectRef>
+          <a:fontRef idx="minor">
+            <a:schemeClr val="lt1"/>
+          </a:fontRef>
+        </p:style>
+        <p:txBody>
+          <a:bodyPr rtlCol="1" anchor="ctr"/>
+          <a:lstStyle/>
+          <a:p>
+            <a:pPr algn="ctr">
+              <a:lnSpc>
+                <a:spcPct val="150000"/>
+              </a:lnSpc>
+            </a:pPr>
+            <a:r>
+              <a:rPr lang="en-US" sz="1000" dirty="0">
+                <a:solidFill>
+                  <a:schemeClr val="bg1"/>
+                </a:solidFill>
+                <a:latin typeface="Bahnschrift SemiBold" panose="020B0502040204020203" pitchFamily="34" charset="0"/>
+              </a:rPr>
+              <a:t>Title: Pitch Perfect</a:t>
+            </a:r>
+          </a:p>
+          <a:p>
+            <a:pPr algn="ctr">
+              <a:lnSpc>
+                <a:spcPct val="150000"/>
+              </a:lnSpc>
+            </a:pPr>
+            <a:r>
+              <a:rPr lang="en-US" sz="1000" dirty="0">
+                <a:solidFill>
+                  <a:schemeClr val="bg1"/>
+                </a:solidFill>
+                <a:latin typeface="Bahnschrift SemiBold" panose="020B0502040204020203" pitchFamily="34" charset="0"/>
+              </a:rPr>
+              <a:t>Overview: College student Beca knows she does not want t...</a:t>
+            </a:r>
+          </a:p>
+          <a:p>
+            <a:pPr algn="ctr">
+              <a:lnSpc>
+                <a:spcPct val="150000"/>
+              </a:lnSpc>
+            </a:pPr>
+            <a:r>
+              <a:rPr lang="en-US" sz="1000" dirty="0">
+                <a:solidFill>
+                  <a:schemeClr val="bg1"/>
+                </a:solidFill>
+                <a:latin typeface="Bahnschrift SemiBold" panose="020B0502040204020203" pitchFamily="34" charset="0"/>
+              </a:rPr>
+              <a:t>Rating: 7.290</a:t>
+            </a:r>
+          </a:p>
+          <a:p>
+            <a:pPr algn="ctr">
+              <a:lnSpc>
+                <a:spcPct val="150000"/>
+              </a:lnSpc>
+            </a:pPr>
+            <a:r>
+              <a:rPr lang="en-US" sz="1000" dirty="0">
+                <a:solidFill>
+                  <a:schemeClr val="bg1"/>
+                </a:solidFill>
+                <a:latin typeface="Bahnschrift SemiBold" panose="020B0502040204020203" pitchFamily="34" charset="0"/>
+              </a:rPr>
+              <a:t>Popularity: 32.496</a:t>
+            </a:r>
+            <a:endParaRPr lang="he-IL" sz="1000" dirty="0">
+              <a:solidFill>
+                <a:schemeClr val="bg1"/>
+              </a:solidFill>
+              <a:latin typeface="Bahnschrift SemiBold" panose="020B0502040204020203" pitchFamily="34" charset="0"/>
+            </a:endParaRPr>
+          </a:p>
+        </p:txBody>
+      </p:sp>
+      <p:pic>
+        <p:nvPicPr>
+          <p:cNvPr id="10" name="תמונה 9">
+            <a:extLst>
+              <a:ext uri="{FF2B5EF4-FFF2-40B4-BE49-F238E27FC236}">
+                <a16:creationId xmlns:a16="http://schemas.microsoft.com/office/drawing/2014/main" id="{981BF403-3305-CEED-F2DA-494C0B16B549}"/>
+              </a:ext>
+            </a:extLst>
+          </p:cNvPr>
+          <p:cNvPicPr>
+            <a:picLocks noChangeAspect="1"/>
+          </p:cNvPicPr>
+          <p:nvPr/>
+        </p:nvPicPr>
+        <p:blipFill>
+          <a:blip r:embed="rId9">
+            <a:extLst>
+              <a:ext uri="{28A0092B-C50C-407E-A947-70E740481C1C}">
+                <a14:useLocalDpi xmlns:a14="http://schemas.microsoft.com/office/drawing/2010/main" val="0"/>
+              </a:ext>
+            </a:extLst>
+          </a:blip>
+          <a:stretch>
+            <a:fillRect/>
+          </a:stretch>
+        </p:blipFill>
+        <p:spPr>
+          <a:xfrm>
+            <a:off x="2943659" y="3546701"/>
+            <a:ext cx="227400" cy="360000"/>
+          </a:xfrm>
+          <a:prstGeom prst="rect">
+            <a:avLst/>
+          </a:prstGeom>
+        </p:spPr>
+      </p:pic>
     </p:spTree>
     <p:extLst>
       <p:ext uri="{BB962C8B-B14F-4D97-AF65-F5344CB8AC3E}">

</xml_diff>